<commit_message>
Updates to latest versions from Murray.
</commit_message>
<xml_diff>
--- a/ULI101-4.2.pptx
+++ b/ULI101-4.2.pptx
@@ -216,7 +216,7 @@
           <a:p>
             <a:fld id="{92107E4A-59D9-C648-BC62-133DA4EC414F}" type="datetimeFigureOut">
               <a:rPr lang="en-US" smtClean="0"/>
-              <a:t>4/29/2022</a:t>
+              <a:t>5/30/2022</a:t>
             </a:fld>
             <a:endParaRPr lang="en-US"/>
           </a:p>
@@ -622,7 +622,7 @@
           <a:p>
             <a:fld id="{4AB1357F-A277-7442-BEE7-4FE250216E54}" type="datetimeFigureOut">
               <a:rPr lang="en-US" smtClean="0"/>
-              <a:t>4/29/2022</a:t>
+              <a:t>5/30/2022</a:t>
             </a:fld>
             <a:endParaRPr lang="en-US"/>
           </a:p>
@@ -833,7 +833,7 @@
           <a:p>
             <a:fld id="{4AB1357F-A277-7442-BEE7-4FE250216E54}" type="datetimeFigureOut">
               <a:rPr lang="en-US" smtClean="0"/>
-              <a:t>4/29/2022</a:t>
+              <a:t>5/30/2022</a:t>
             </a:fld>
             <a:endParaRPr lang="en-US"/>
           </a:p>
@@ -1048,7 +1048,7 @@
           <a:p>
             <a:fld id="{4AB1357F-A277-7442-BEE7-4FE250216E54}" type="datetimeFigureOut">
               <a:rPr lang="en-US" smtClean="0"/>
-              <a:t>4/29/2022</a:t>
+              <a:t>5/30/2022</a:t>
             </a:fld>
             <a:endParaRPr lang="en-US"/>
           </a:p>
@@ -1249,7 +1249,7 @@
           <a:p>
             <a:fld id="{4AB1357F-A277-7442-BEE7-4FE250216E54}" type="datetimeFigureOut">
               <a:rPr lang="en-US" smtClean="0"/>
-              <a:t>4/29/2022</a:t>
+              <a:t>5/30/2022</a:t>
             </a:fld>
             <a:endParaRPr lang="en-US"/>
           </a:p>
@@ -1528,7 +1528,7 @@
           <a:p>
             <a:fld id="{4AB1357F-A277-7442-BEE7-4FE250216E54}" type="datetimeFigureOut">
               <a:rPr lang="en-US" smtClean="0"/>
-              <a:t>4/29/2022</a:t>
+              <a:t>5/30/2022</a:t>
             </a:fld>
             <a:endParaRPr lang="en-US"/>
           </a:p>
@@ -1796,7 +1796,7 @@
           <a:p>
             <a:fld id="{4AB1357F-A277-7442-BEE7-4FE250216E54}" type="datetimeFigureOut">
               <a:rPr lang="en-US" smtClean="0"/>
-              <a:t>4/29/2022</a:t>
+              <a:t>5/30/2022</a:t>
             </a:fld>
             <a:endParaRPr lang="en-US"/>
           </a:p>
@@ -2212,7 +2212,7 @@
           <a:p>
             <a:fld id="{4AB1357F-A277-7442-BEE7-4FE250216E54}" type="datetimeFigureOut">
               <a:rPr lang="en-US" smtClean="0"/>
-              <a:t>4/29/2022</a:t>
+              <a:t>5/30/2022</a:t>
             </a:fld>
             <a:endParaRPr lang="en-US"/>
           </a:p>
@@ -2361,7 +2361,7 @@
           <a:p>
             <a:fld id="{4AB1357F-A277-7442-BEE7-4FE250216E54}" type="datetimeFigureOut">
               <a:rPr lang="en-US" smtClean="0"/>
-              <a:t>4/29/2022</a:t>
+              <a:t>5/30/2022</a:t>
             </a:fld>
             <a:endParaRPr lang="en-US"/>
           </a:p>
@@ -2487,7 +2487,7 @@
           <a:p>
             <a:fld id="{4AB1357F-A277-7442-BEE7-4FE250216E54}" type="datetimeFigureOut">
               <a:rPr lang="en-US" smtClean="0"/>
-              <a:t>4/29/2022</a:t>
+              <a:t>5/30/2022</a:t>
             </a:fld>
             <a:endParaRPr lang="en-US"/>
           </a:p>
@@ -2738,7 +2738,7 @@
           <a:p>
             <a:fld id="{4AB1357F-A277-7442-BEE7-4FE250216E54}" type="datetimeFigureOut">
               <a:rPr lang="en-US" smtClean="0"/>
-              <a:t>4/29/2022</a:t>
+              <a:t>5/30/2022</a:t>
             </a:fld>
             <a:endParaRPr lang="en-US"/>
           </a:p>
@@ -3183,7 +3183,7 @@
           <a:p>
             <a:fld id="{4AB1357F-A277-7442-BEE7-4FE250216E54}" type="datetimeFigureOut">
               <a:rPr lang="en-US" smtClean="0"/>
-              <a:t>4/29/2022</a:t>
+              <a:t>5/30/2022</a:t>
             </a:fld>
             <a:endParaRPr lang="en-US"/>
           </a:p>
@@ -3510,7 +3510,7 @@
           <a:p>
             <a:fld id="{4AB1357F-A277-7442-BEE7-4FE250216E54}" type="datetimeFigureOut">
               <a:rPr lang="en-US" smtClean="0"/>
-              <a:t>4/29/2022</a:t>
+              <a:t>5/30/2022</a:t>
             </a:fld>
             <a:endParaRPr lang="en-US"/>
           </a:p>
@@ -5027,7 +5027,7 @@
           <a:blip r:embed="rId2">
             <a:extLst>
               <a:ext uri="{837473B0-CC2E-450A-ABE3-18F120FF3D39}">
-                <a1611:picAttrSrcUrl xmlns="" xmlns:a1611="http://schemas.microsoft.com/office/drawing/2016/11/main" r:id="rId3"/>
+                <a1611:picAttrSrcUrl xmlns:a1611="http://schemas.microsoft.com/office/drawing/2016/11/main" xmlns="" r:id="rId3"/>
               </a:ext>
             </a:extLst>
           </a:blip>
@@ -5275,12 +5275,16 @@
               <a:t> </a:t>
             </a:r>
             <a:r>
+              <a:rPr lang="en-CA" b="1" dirty="0" err="1" smtClean="0"/>
+              <a:t>Tutorial</a:t>
+            </a:r>
+            <a:r>
               <a:rPr lang="en-CA" b="1" dirty="0" smtClean="0"/>
-              <a:t>Tutorial2</a:t>
+              <a:t> 4: </a:t>
             </a:r>
             <a:r>
               <a:rPr lang="en-CA" b="1" dirty="0"/>
-              <a:t>: Unix / Linux File Management </a:t>
+              <a:t>Unix / Linux File Management </a:t>
             </a:r>
             <a:r>
               <a:rPr lang="en-US" b="1" spc="-1" dirty="0">
@@ -6430,7 +6434,7 @@
           <a:blip r:embed="rId3">
             <a:extLst>
               <a:ext uri="{837473B0-CC2E-450A-ABE3-18F120FF3D39}">
-                <a1611:picAttrSrcUrl xmlns="" xmlns:a1611="http://schemas.microsoft.com/office/drawing/2016/11/main" r:id="rId4"/>
+                <a1611:picAttrSrcUrl xmlns:a1611="http://schemas.microsoft.com/office/drawing/2016/11/main" xmlns="" r:id="rId4"/>
               </a:ext>
             </a:extLst>
           </a:blip>
@@ -6466,7 +6470,7 @@
           <a:blip r:embed="rId5">
             <a:extLst>
               <a:ext uri="{837473B0-CC2E-450A-ABE3-18F120FF3D39}">
-                <a1611:picAttrSrcUrl xmlns="" xmlns:a1611="http://schemas.microsoft.com/office/drawing/2016/11/main" r:id="rId6"/>
+                <a1611:picAttrSrcUrl xmlns:a1611="http://schemas.microsoft.com/office/drawing/2016/11/main" xmlns="" r:id="rId6"/>
               </a:ext>
             </a:extLst>
           </a:blip>
@@ -8460,7 +8464,7 @@
           <a:blip r:embed="rId2">
             <a:extLst>
               <a:ext uri="{837473B0-CC2E-450A-ABE3-18F120FF3D39}">
-                <a1611:picAttrSrcUrl xmlns="" xmlns:a1611="http://schemas.microsoft.com/office/drawing/2016/11/main" r:id="rId3"/>
+                <a1611:picAttrSrcUrl xmlns:a1611="http://schemas.microsoft.com/office/drawing/2016/11/main" xmlns="" r:id="rId3"/>
               </a:ext>
             </a:extLst>
           </a:blip>
@@ -10105,7 +10109,7 @@
           <a:blip r:embed="rId2">
             <a:extLst>
               <a:ext uri="{837473B0-CC2E-450A-ABE3-18F120FF3D39}">
-                <a1611:picAttrSrcUrl xmlns="" xmlns:a1611="http://schemas.microsoft.com/office/drawing/2016/11/main" r:id="rId3"/>
+                <a1611:picAttrSrcUrl xmlns:a1611="http://schemas.microsoft.com/office/drawing/2016/11/main" xmlns="" r:id="rId3"/>
               </a:ext>
             </a:extLst>
           </a:blip>

</xml_diff>